<commit_message>
updated on August 28
</commit_message>
<xml_diff>
--- a/Notes/Chapter7/Chapter7.pptx
+++ b/Notes/Chapter7/Chapter7.pptx
@@ -10392,7 +10392,10 @@
                 <a:endParaRPr lang="en-US" altLang="en-US" dirty="0"/>
               </a:p>
               <a:p>
-                <a:pPr marL="0" indent="0">
+                <a:pPr marL="0" lvl="1" indent="0">
+                  <a:spcBef>
+                    <a:spcPts val="1000"/>
+                  </a:spcBef>
                   <a:buNone/>
                 </a:pPr>
                 <a:r>
@@ -10582,11 +10585,7 @@
                 </a14:m>
                 <a:r>
                   <a:rPr lang="en-US" altLang="zh-CN" dirty="0" smtClean="0"/>
-                  <a:t>  </a:t>
-                </a:r>
-                <a:r>
-                  <a:rPr lang="en-US" altLang="zh-CN" dirty="0" smtClean="0"/>
-                  <a:t>and degrees of freedom </a:t>
+                  <a:t>  and degrees of freedom </a:t>
                 </a:r>
                 <a14:m>
                   <m:oMath xmlns:m="http://schemas.openxmlformats.org/officeDocument/2006/math">
@@ -10602,20 +10601,103 @@
                       </a:rPr>
                       <m:t>=</m:t>
                     </m:r>
-                    <m:r>
-                      <a:rPr lang="en-US" altLang="zh-CN" b="0" i="1" smtClean="0">
-                        <a:latin typeface="Cambria Math" panose="02040503050406030204" pitchFamily="18" charset="0"/>
-                      </a:rPr>
-                      <m:t>𝑛</m:t>
-                    </m:r>
-                    <m:r>
-                      <a:rPr lang="en-US" altLang="zh-CN" b="0" i="1" smtClean="0">
+                    <m:sSub>
+                      <m:sSubPr>
+                        <m:ctrlPr>
+                          <a:rPr lang="en-US" altLang="en-US" i="1">
+                            <a:latin typeface="Cambria Math" panose="02040503050406030204" pitchFamily="18" charset="0"/>
+                          </a:rPr>
+                        </m:ctrlPr>
+                      </m:sSubPr>
+                      <m:e>
+                        <m:r>
+                          <m:rPr>
+                            <m:sty m:val="p"/>
+                          </m:rPr>
+                          <a:rPr lang="en-US" altLang="en-US">
+                            <a:latin typeface="Cambria Math" panose="02040503050406030204" pitchFamily="18" charset="0"/>
+                          </a:rPr>
+                          <m:t>min</m:t>
+                        </m:r>
+                        <m:r>
+                          <a:rPr lang="en-US" altLang="en-US" i="1">
+                            <a:latin typeface="Cambria Math" panose="02040503050406030204" pitchFamily="18" charset="0"/>
+                          </a:rPr>
+                          <m:t>⁡(</m:t>
+                        </m:r>
+                        <m:r>
+                          <a:rPr lang="en-US" altLang="en-US" i="1">
+                            <a:latin typeface="Cambria Math" panose="02040503050406030204" pitchFamily="18" charset="0"/>
+                          </a:rPr>
+                          <m:t>𝑛</m:t>
+                        </m:r>
+                      </m:e>
+                      <m:sub>
+                        <m:r>
+                          <a:rPr lang="en-US" altLang="en-US" i="1">
+                            <a:latin typeface="Cambria Math" panose="02040503050406030204" pitchFamily="18" charset="0"/>
+                          </a:rPr>
+                          <m:t>1</m:t>
+                        </m:r>
+                      </m:sub>
+                    </m:sSub>
+                    <m:r>
+                      <a:rPr lang="en-US" altLang="en-US" i="1">
+                        <a:latin typeface="Cambria Math" panose="02040503050406030204" pitchFamily="18" charset="0"/>
+                      </a:rPr>
+                      <m:t>−1,</m:t>
+                    </m:r>
+                    <m:sSub>
+                      <m:sSubPr>
+                        <m:ctrlPr>
+                          <a:rPr lang="en-US" altLang="en-US" i="1">
+                            <a:latin typeface="Cambria Math" panose="02040503050406030204" pitchFamily="18" charset="0"/>
+                          </a:rPr>
+                        </m:ctrlPr>
+                      </m:sSubPr>
+                      <m:e>
+                        <m:r>
+                          <a:rPr lang="en-US" altLang="en-US" i="1">
+                            <a:latin typeface="Cambria Math" panose="02040503050406030204" pitchFamily="18" charset="0"/>
+                          </a:rPr>
+                          <m:t> </m:t>
+                        </m:r>
+                        <m:r>
+                          <a:rPr lang="en-US" altLang="en-US" i="1">
+                            <a:latin typeface="Cambria Math" panose="02040503050406030204" pitchFamily="18" charset="0"/>
+                          </a:rPr>
+                          <m:t>𝑛</m:t>
+                        </m:r>
+                      </m:e>
+                      <m:sub>
+                        <m:r>
+                          <a:rPr lang="en-US" altLang="en-US" i="1">
+                            <a:latin typeface="Cambria Math" panose="02040503050406030204" pitchFamily="18" charset="0"/>
+                          </a:rPr>
+                          <m:t>2</m:t>
+                        </m:r>
+                      </m:sub>
+                    </m:sSub>
+                    <m:r>
+                      <a:rPr lang="en-US" altLang="en-US" i="1">
                         <a:latin typeface="Cambria Math" panose="02040503050406030204" pitchFamily="18" charset="0"/>
                       </a:rPr>
                       <m:t>−1</m:t>
+                    </m:r>
+                    <m:r>
+                      <a:rPr lang="en-US" altLang="en-US" i="1">
+                        <a:latin typeface="Cambria Math" panose="02040503050406030204" pitchFamily="18" charset="0"/>
+                      </a:rPr>
+                      <m:t>)</m:t>
                     </m:r>
                   </m:oMath>
                 </a14:m>
+                <a:endParaRPr lang="en-US" altLang="en-US" dirty="0"/>
+              </a:p>
+              <a:p>
+                <a:pPr marL="0" indent="0">
+                  <a:buNone/>
+                </a:pPr>
                 <a:endParaRPr lang="en-US" altLang="zh-CN" dirty="0" smtClean="0"/>
               </a:p>
             </p:txBody>
@@ -10636,7 +10718,7 @@
               <a:blipFill>
                 <a:blip r:embed="rId3"/>
                 <a:stretch>
-                  <a:fillRect l="-1507" t="-2941"/>
+                  <a:fillRect l="-1333" t="-2941"/>
                 </a:stretch>
               </a:blipFill>
             </p:spPr>
@@ -10714,8 +10796,8 @@
           </a:p>
         </p:txBody>
       </p:sp>
-      <mc:AlternateContent xmlns:mc="http://schemas.openxmlformats.org/markup-compatibility/2006">
-        <mc:Choice xmlns:a14="http://schemas.microsoft.com/office/drawing/2010/main" Requires="a14">
+      <mc:AlternateContent xmlns:mc="http://schemas.openxmlformats.org/markup-compatibility/2006" xmlns:a14="http://schemas.microsoft.com/office/drawing/2010/main">
+        <mc:Choice Requires="a14">
           <p:sp>
             <p:nvSpPr>
               <p:cNvPr id="19459" name="Rectangle 6"/>
@@ -11575,15 +11657,7 @@
               <a:p>
                 <a:r>
                   <a:rPr lang="en-US" altLang="en-US" dirty="0"/>
-                  <a:t>One-Sided, </a:t>
-                </a:r>
-                <a:r>
-                  <a:rPr lang="en-US" altLang="en-US" dirty="0"/>
-                  <a:t>“Less </a:t>
-                </a:r>
-                <a:r>
-                  <a:rPr lang="en-US" altLang="en-US" dirty="0"/>
-                  <a:t>than” </a:t>
+                  <a:t>One-Sided, “Less than” </a:t>
                 </a:r>
                 <a:r>
                   <a:rPr lang="en-US" altLang="en-US" dirty="0" smtClean="0"/>
@@ -11687,15 +11761,7 @@
                         <a:ea typeface="Cambria Math" panose="02040503050406030204" pitchFamily="18" charset="0"/>
                         <a:sym typeface="Symbol" panose="05050102010706020507" pitchFamily="18" charset="2"/>
                       </a:rPr>
-                      <m:t>−</m:t>
-                    </m:r>
-                    <m:r>
-                      <a:rPr lang="en-US" altLang="zh-CN" i="1">
-                        <a:latin typeface="Cambria Math" panose="02040503050406030204" pitchFamily="18" charset="0"/>
-                        <a:ea typeface="Cambria Math" panose="02040503050406030204" pitchFamily="18" charset="0"/>
-                        <a:sym typeface="Symbol" panose="05050102010706020507" pitchFamily="18" charset="2"/>
-                      </a:rPr>
-                      <m:t> </m:t>
+                      <m:t>− </m:t>
                     </m:r>
                     <m:sSub>
                       <m:sSubPr>
@@ -11742,31 +11808,7 @@
                         <a:ea typeface="Cambria Math" panose="02040503050406030204" pitchFamily="18" charset="0"/>
                         <a:sym typeface="Symbol" panose="05050102010706020507" pitchFamily="18" charset="2"/>
                       </a:rPr>
-                      <m:t>=</m:t>
-                    </m:r>
-                    <m:r>
-                      <a:rPr lang="en-US" altLang="zh-CN" i="1">
-                        <a:latin typeface="Cambria Math" panose="02040503050406030204" pitchFamily="18" charset="0"/>
-                        <a:ea typeface="Cambria Math" panose="02040503050406030204" pitchFamily="18" charset="0"/>
-                        <a:sym typeface="Symbol" panose="05050102010706020507" pitchFamily="18" charset="2"/>
-                      </a:rPr>
-                      <m:t> </m:t>
-                    </m:r>
-                    <m:r>
-                      <a:rPr lang="en-US" altLang="zh-CN" i="1">
-                        <a:latin typeface="Cambria Math" panose="02040503050406030204" pitchFamily="18" charset="0"/>
-                        <a:ea typeface="Cambria Math" panose="02040503050406030204" pitchFamily="18" charset="0"/>
-                        <a:sym typeface="Symbol" panose="05050102010706020507" pitchFamily="18" charset="2"/>
-                      </a:rPr>
-                      <m:t>0</m:t>
-                    </m:r>
-                    <m:r>
-                      <a:rPr lang="en-US" altLang="zh-CN" i="1">
-                        <a:latin typeface="Cambria Math" panose="02040503050406030204" pitchFamily="18" charset="0"/>
-                        <a:ea typeface="Cambria Math" panose="02040503050406030204" pitchFamily="18" charset="0"/>
-                        <a:sym typeface="Symbol" panose="05050102010706020507" pitchFamily="18" charset="2"/>
-                      </a:rPr>
-                      <m:t>  </m:t>
+                      <m:t>= 0  </m:t>
                     </m:r>
                     <m:r>
                       <a:rPr lang="en-US" altLang="en-US" i="1">
@@ -11872,15 +11914,7 @@
                         <a:ea typeface="Cambria Math" panose="02040503050406030204" pitchFamily="18" charset="0"/>
                         <a:sym typeface="Symbol" panose="05050102010706020507" pitchFamily="18" charset="2"/>
                       </a:rPr>
-                      <m:t>−</m:t>
-                    </m:r>
-                    <m:r>
-                      <a:rPr lang="en-US" altLang="zh-CN" i="1">
-                        <a:latin typeface="Cambria Math" panose="02040503050406030204" pitchFamily="18" charset="0"/>
-                        <a:ea typeface="Cambria Math" panose="02040503050406030204" pitchFamily="18" charset="0"/>
-                        <a:sym typeface="Symbol" panose="05050102010706020507" pitchFamily="18" charset="2"/>
-                      </a:rPr>
-                      <m:t> </m:t>
+                      <m:t>− </m:t>
                     </m:r>
                     <m:sSub>
                       <m:sSubPr>
@@ -12120,15 +12154,7 @@
                         <a:ea typeface="Cambria Math" panose="02040503050406030204" pitchFamily="18" charset="0"/>
                         <a:sym typeface="Symbol" panose="05050102010706020507" pitchFamily="18" charset="2"/>
                       </a:rPr>
-                      <m:t>−</m:t>
-                    </m:r>
-                    <m:r>
-                      <a:rPr lang="en-US" altLang="zh-CN" i="1">
-                        <a:latin typeface="Cambria Math" panose="02040503050406030204" pitchFamily="18" charset="0"/>
-                        <a:ea typeface="Cambria Math" panose="02040503050406030204" pitchFamily="18" charset="0"/>
-                        <a:sym typeface="Symbol" panose="05050102010706020507" pitchFamily="18" charset="2"/>
-                      </a:rPr>
-                      <m:t> </m:t>
+                      <m:t>− </m:t>
                     </m:r>
                     <m:sSub>
                       <m:sSubPr>
@@ -12175,31 +12201,7 @@
                         <a:ea typeface="Cambria Math" panose="02040503050406030204" pitchFamily="18" charset="0"/>
                         <a:sym typeface="Symbol" panose="05050102010706020507" pitchFamily="18" charset="2"/>
                       </a:rPr>
-                      <m:t>=</m:t>
-                    </m:r>
-                    <m:r>
-                      <a:rPr lang="en-US" altLang="zh-CN" i="1">
-                        <a:latin typeface="Cambria Math" panose="02040503050406030204" pitchFamily="18" charset="0"/>
-                        <a:ea typeface="Cambria Math" panose="02040503050406030204" pitchFamily="18" charset="0"/>
-                        <a:sym typeface="Symbol" panose="05050102010706020507" pitchFamily="18" charset="2"/>
-                      </a:rPr>
-                      <m:t> </m:t>
-                    </m:r>
-                    <m:r>
-                      <a:rPr lang="en-US" altLang="zh-CN" i="1">
-                        <a:latin typeface="Cambria Math" panose="02040503050406030204" pitchFamily="18" charset="0"/>
-                        <a:ea typeface="Cambria Math" panose="02040503050406030204" pitchFamily="18" charset="0"/>
-                        <a:sym typeface="Symbol" panose="05050102010706020507" pitchFamily="18" charset="2"/>
-                      </a:rPr>
-                      <m:t>0</m:t>
-                    </m:r>
-                    <m:r>
-                      <a:rPr lang="en-US" altLang="zh-CN" i="1">
-                        <a:latin typeface="Cambria Math" panose="02040503050406030204" pitchFamily="18" charset="0"/>
-                        <a:ea typeface="Cambria Math" panose="02040503050406030204" pitchFamily="18" charset="0"/>
-                        <a:sym typeface="Symbol" panose="05050102010706020507" pitchFamily="18" charset="2"/>
-                      </a:rPr>
-                      <m:t>  </m:t>
+                      <m:t>= 0  </m:t>
                     </m:r>
                     <m:r>
                       <a:rPr lang="en-US" altLang="en-US" i="1">
@@ -12305,15 +12307,7 @@
                         <a:ea typeface="Cambria Math" panose="02040503050406030204" pitchFamily="18" charset="0"/>
                         <a:sym typeface="Symbol" panose="05050102010706020507" pitchFamily="18" charset="2"/>
                       </a:rPr>
-                      <m:t>−</m:t>
-                    </m:r>
-                    <m:r>
-                      <a:rPr lang="en-US" altLang="zh-CN" i="1">
-                        <a:latin typeface="Cambria Math" panose="02040503050406030204" pitchFamily="18" charset="0"/>
-                        <a:ea typeface="Cambria Math" panose="02040503050406030204" pitchFamily="18" charset="0"/>
-                        <a:sym typeface="Symbol" panose="05050102010706020507" pitchFamily="18" charset="2"/>
-                      </a:rPr>
-                      <m:t> </m:t>
+                      <m:t>− </m:t>
                     </m:r>
                     <m:sSub>
                       <m:sSubPr>
@@ -12655,7 +12649,7 @@
             </p:txBody>
           </p:sp>
         </mc:Choice>
-        <mc:Fallback>
+        <mc:Fallback xmlns="">
           <p:sp>
             <p:nvSpPr>
               <p:cNvPr id="19459" name="Rectangle 6"/>
@@ -15316,27 +15310,7 @@
             </a:pPr>
             <a:r>
               <a:rPr lang="en-US" altLang="en-US" dirty="0" smtClean="0"/>
-              <a:t>The summary </a:t>
-            </a:r>
-            <a:r>
-              <a:rPr lang="en-US" altLang="en-US" dirty="0" smtClean="0"/>
-              <a:t>statistics </a:t>
-            </a:r>
-            <a:r>
-              <a:rPr lang="en-US" altLang="en-US" dirty="0" smtClean="0"/>
-              <a:t>for </a:t>
-            </a:r>
-            <a:r>
-              <a:rPr lang="en-US" altLang="en-US" dirty="0" smtClean="0"/>
-              <a:t>three groups of </a:t>
-            </a:r>
-            <a:r>
-              <a:rPr lang="en-US" altLang="en-US" dirty="0" smtClean="0"/>
-              <a:t>observations are presented below. </a:t>
-            </a:r>
-            <a:r>
-              <a:rPr lang="en-US" altLang="en-US" dirty="0" smtClean="0"/>
-              <a:t>Is there significant evidence that the population means vary across </a:t>
+              <a:t>The summary statistics for three groups of observations are presented below. Is there significant evidence that the population means vary across </a:t>
             </a:r>
             <a:r>
               <a:rPr lang="en-US" altLang="en-US" smtClean="0"/>
@@ -18189,11 +18163,7 @@
           <a:p>
             <a:r>
               <a:rPr lang="en-US" altLang="en-US" dirty="0" smtClean="0"/>
-              <a:t>Hypothesis Testing </a:t>
-            </a:r>
-            <a:r>
-              <a:rPr lang="en-US" altLang="en-US" dirty="0" smtClean="0"/>
-              <a:t>(</a:t>
+              <a:t>Hypothesis Testing (</a:t>
             </a:r>
             <a:r>
               <a:rPr lang="en-US" altLang="en-US" i="1" dirty="0" smtClean="0">

</xml_diff>